<commit_message>
CS401 Lab #0 1/10/20: updating to address need to add System.out before println
</commit_message>
<xml_diff>
--- a/cs401_lab0_1_10_20.pptx
+++ b/cs401_lab0_1_10_20.pptx
@@ -12,10 +12,11 @@
     <p:sldId id="260" r:id="rId6"/>
     <p:sldId id="261" r:id="rId7"/>
     <p:sldId id="262" r:id="rId8"/>
-    <p:sldId id="263" r:id="rId9"/>
-    <p:sldId id="265" r:id="rId10"/>
-    <p:sldId id="264" r:id="rId11"/>
-    <p:sldId id="266" r:id="rId12"/>
+    <p:sldId id="267" r:id="rId9"/>
+    <p:sldId id="263" r:id="rId10"/>
+    <p:sldId id="265" r:id="rId11"/>
+    <p:sldId id="264" r:id="rId12"/>
+    <p:sldId id="266" r:id="rId13"/>
   </p:sldIdLst>
   <p:sldSz cx="9144000" cy="6858000" type="screen4x3"/>
   <p:notesSz cx="6858000" cy="9144000"/>
@@ -2997,7 +2998,7 @@
           <p:cNvPr id="4" name="TextBox 3">
             <a:extLst>
               <a:ext uri="{FF2B5EF4-FFF2-40B4-BE49-F238E27FC236}">
-                <a16:creationId xmlns:a16="http://schemas.microsoft.com/office/drawing/2014/main" id="{8A67A37A-C488-40D7-A088-6774405888BB}"/>
+                <a16:creationId xmlns:a16="http://schemas.microsoft.com/office/drawing/2014/main" xmlns="" id="{8A67A37A-C488-40D7-A088-6774405888BB}"/>
               </a:ext>
             </a:extLst>
           </p:cNvPr>
@@ -3035,7 +3036,7 @@
           <p:cNvPr id="5" name="TextBox 4">
             <a:extLst>
               <a:ext uri="{FF2B5EF4-FFF2-40B4-BE49-F238E27FC236}">
-                <a16:creationId xmlns:a16="http://schemas.microsoft.com/office/drawing/2014/main" id="{EC931DCA-4690-4B93-9419-BA902293A61A}"/>
+                <a16:creationId xmlns:a16="http://schemas.microsoft.com/office/drawing/2014/main" xmlns="" id="{EC931DCA-4690-4B93-9419-BA902293A61A}"/>
               </a:ext>
             </a:extLst>
           </p:cNvPr>
@@ -3116,7 +3117,7 @@
           <p:cNvPr id="2" name="TextBox 1">
             <a:extLst>
               <a:ext uri="{FF2B5EF4-FFF2-40B4-BE49-F238E27FC236}">
-                <a16:creationId xmlns:a16="http://schemas.microsoft.com/office/drawing/2014/main" id="{8A3F13DF-4328-4B16-BDF5-C68E877EB54E}"/>
+                <a16:creationId xmlns:a16="http://schemas.microsoft.com/office/drawing/2014/main" xmlns="" id="{8A3F13DF-4328-4B16-BDF5-C68E877EB54E}"/>
               </a:ext>
             </a:extLst>
           </p:cNvPr>
@@ -3126,7 +3127,7 @@
         <p:spPr>
           <a:xfrm>
             <a:off x="0" y="0"/>
-            <a:ext cx="8134066" cy="954107"/>
+            <a:ext cx="8134066" cy="523220"/>
           </a:xfrm>
           <a:prstGeom prst="rect">
             <a:avLst/>
@@ -3144,17 +3145,17 @@
                   <a:srgbClr val="002060"/>
                 </a:solidFill>
               </a:rPr>
-              <a:t>Submit the four policy PDFs (no modification needed for the policy files)</a:t>
+              <a:t>Download and review the four policy documents</a:t>
             </a:r>
           </a:p>
         </p:txBody>
       </p:sp>
       <p:pic>
         <p:nvPicPr>
-          <p:cNvPr id="11" name="Picture 10" descr="Professor Hoffman's CS 401 - Mozilla Firefox">
+          <p:cNvPr id="5" name="Picture 4" descr="2020 SPRING CS-401 CS LAB #0 - Mozilla Firefox">
             <a:extLst>
               <a:ext uri="{FF2B5EF4-FFF2-40B4-BE49-F238E27FC236}">
-                <a16:creationId xmlns:a16="http://schemas.microsoft.com/office/drawing/2014/main" id="{D5C6404A-6851-4BBD-89EA-C9A5F7078EA5}"/>
+                <a16:creationId xmlns:a16="http://schemas.microsoft.com/office/drawing/2014/main" xmlns="" id="{0488EA90-049C-44E9-A737-5F815994EAD3}"/>
               </a:ext>
             </a:extLst>
           </p:cNvPr>
@@ -3171,13 +3172,13 @@
               </a:ext>
             </a:extLst>
           </a:blip>
-          <a:srcRect t="7802"/>
+          <a:srcRect t="5666" r="4434" b="25366"/>
           <a:stretch/>
         </p:blipFill>
         <p:spPr>
           <a:xfrm>
-            <a:off x="271612" y="954107"/>
-            <a:ext cx="5577840" cy="3544476"/>
+            <a:off x="102591" y="878833"/>
+            <a:ext cx="8651116" cy="3384371"/>
           </a:xfrm>
           <a:prstGeom prst="rect">
             <a:avLst/>
@@ -3191,86 +3192,60 @@
       </p:pic>
       <p:sp>
         <p:nvSpPr>
-          <p:cNvPr id="12" name="TextBox 11">
+          <p:cNvPr id="7" name="Rectangle 6">
             <a:extLst>
               <a:ext uri="{FF2B5EF4-FFF2-40B4-BE49-F238E27FC236}">
-                <a16:creationId xmlns:a16="http://schemas.microsoft.com/office/drawing/2014/main" id="{D3AD2C79-846C-4DD2-83C1-4AD3F8B0F956}"/>
+                <a16:creationId xmlns:a16="http://schemas.microsoft.com/office/drawing/2014/main" xmlns="" id="{9DCE6BE8-7B2E-4F21-8CDA-BF6F30E4CDC3}"/>
               </a:ext>
             </a:extLst>
           </p:cNvPr>
-          <p:cNvSpPr txBox="1"/>
+          <p:cNvSpPr/>
           <p:nvPr/>
         </p:nvSpPr>
         <p:spPr>
           <a:xfrm>
-            <a:off x="121708" y="4575527"/>
-            <a:ext cx="6407969" cy="1754326"/>
+            <a:off x="568712" y="3491219"/>
+            <a:ext cx="1338147" cy="523220"/>
           </a:xfrm>
           <a:prstGeom prst="rect">
             <a:avLst/>
           </a:prstGeom>
           <a:noFill/>
-        </p:spPr>
-        <p:txBody>
-          <a:bodyPr wrap="square" rtlCol="0">
-            <a:spAutoFit/>
-          </a:bodyPr>
-          <a:lstStyle/>
-          <a:p>
-            <a:r>
-              <a:rPr lang="en-US" dirty="0"/>
-              <a:t>If you can’t login, then send an email to both </a:t>
-            </a:r>
-            <a:r>
-              <a:rPr lang="en-US" dirty="0">
-                <a:hlinkClick r:id="rId3"/>
-              </a:rPr>
-              <a:t>HoffmanT@pitt.edu</a:t>
-            </a:r>
-            <a:r>
-              <a:rPr lang="en-US" dirty="0"/>
-              <a:t>  and </a:t>
-            </a:r>
-            <a:r>
-              <a:rPr lang="en-US" dirty="0">
-                <a:hlinkClick r:id="rId4"/>
-              </a:rPr>
-              <a:t>mjd73@pitt.edu</a:t>
-            </a:r>
-            <a:r>
-              <a:rPr lang="en-US" dirty="0"/>
-              <a:t> with a subject line with this format: </a:t>
-            </a:r>
-          </a:p>
-          <a:p>
-            <a:r>
-              <a:rPr lang="en-US" dirty="0"/>
-              <a:t>SUBJ: 401 &lt;</a:t>
-            </a:r>
-            <a:r>
-              <a:rPr lang="en-US" dirty="0" err="1"/>
-              <a:t>pitt</a:t>
-            </a:r>
-            <a:r>
-              <a:rPr lang="en-US" dirty="0"/>
-              <a:t>-username&gt; HANDIN WON’T LET ME LOGIN</a:t>
-            </a:r>
-          </a:p>
-          <a:p>
-            <a:endParaRPr lang="en-US" dirty="0"/>
-          </a:p>
-          <a:p>
-            <a:r>
-              <a:rPr lang="en-US" dirty="0"/>
-              <a:t>Send this from your Pitt address.  In the body of the email, include your full name, Pitt username, and PeopleSoft number.</a:t>
-            </a:r>
+          <a:ln w="38100">
+            <a:solidFill>
+              <a:srgbClr val="92D050"/>
+            </a:solidFill>
+          </a:ln>
+        </p:spPr>
+        <p:style>
+          <a:lnRef idx="2">
+            <a:schemeClr val="accent1">
+              <a:shade val="50000"/>
+            </a:schemeClr>
+          </a:lnRef>
+          <a:fillRef idx="1">
+            <a:schemeClr val="accent1"/>
+          </a:fillRef>
+          <a:effectRef idx="0">
+            <a:schemeClr val="accent1"/>
+          </a:effectRef>
+          <a:fontRef idx="minor">
+            <a:schemeClr val="lt1"/>
+          </a:fontRef>
+        </p:style>
+        <p:txBody>
+          <a:bodyPr rtlCol="0" anchor="ctr"/>
+          <a:lstStyle/>
+          <a:p>
+            <a:pPr algn="ctr"/>
+            <a:endParaRPr lang="en-US"/>
           </a:p>
         </p:txBody>
       </p:sp>
     </p:spTree>
     <p:extLst>
       <p:ext uri="{BB962C8B-B14F-4D97-AF65-F5344CB8AC3E}">
-        <p14:creationId xmlns:p14="http://schemas.microsoft.com/office/powerpoint/2010/main" val="2211985909"/>
+        <p14:creationId xmlns:p14="http://schemas.microsoft.com/office/powerpoint/2010/main" val="1466707125"/>
       </p:ext>
     </p:extLst>
   </p:cSld>
@@ -3302,7 +3277,7 @@
           <p:cNvPr id="2" name="TextBox 1">
             <a:extLst>
               <a:ext uri="{FF2B5EF4-FFF2-40B4-BE49-F238E27FC236}">
-                <a16:creationId xmlns:a16="http://schemas.microsoft.com/office/drawing/2014/main" id="{8A3F13DF-4328-4B16-BDF5-C68E877EB54E}"/>
+                <a16:creationId xmlns:a16="http://schemas.microsoft.com/office/drawing/2014/main" xmlns="" id="{8A3F13DF-4328-4B16-BDF5-C68E877EB54E}"/>
               </a:ext>
             </a:extLst>
           </p:cNvPr>
@@ -3337,10 +3312,196 @@
       </p:sp>
       <p:pic>
         <p:nvPicPr>
+          <p:cNvPr id="11" name="Picture 10" descr="Professor Hoffman's CS 401 - Mozilla Firefox">
+            <a:extLst>
+              <a:ext uri="{FF2B5EF4-FFF2-40B4-BE49-F238E27FC236}">
+                <a16:creationId xmlns:a16="http://schemas.microsoft.com/office/drawing/2014/main" xmlns="" id="{D5C6404A-6851-4BBD-89EA-C9A5F7078EA5}"/>
+              </a:ext>
+            </a:extLst>
+          </p:cNvPr>
+          <p:cNvPicPr>
+            <a:picLocks noChangeAspect="1"/>
+          </p:cNvPicPr>
+          <p:nvPr/>
+        </p:nvPicPr>
+        <p:blipFill rotWithShape="1">
+          <a:blip r:embed="rId2">
+            <a:extLst>
+              <a:ext uri="{28A0092B-C50C-407E-A947-70E740481C1C}">
+                <a14:useLocalDpi xmlns:a14="http://schemas.microsoft.com/office/drawing/2010/main" val="0"/>
+              </a:ext>
+            </a:extLst>
+          </a:blip>
+          <a:srcRect t="7802"/>
+          <a:stretch/>
+        </p:blipFill>
+        <p:spPr>
+          <a:xfrm>
+            <a:off x="271612" y="954107"/>
+            <a:ext cx="5577840" cy="3544476"/>
+          </a:xfrm>
+          <a:prstGeom prst="rect">
+            <a:avLst/>
+          </a:prstGeom>
+          <a:ln>
+            <a:solidFill>
+              <a:schemeClr val="tx1"/>
+            </a:solidFill>
+          </a:ln>
+        </p:spPr>
+      </p:pic>
+      <p:sp>
+        <p:nvSpPr>
+          <p:cNvPr id="12" name="TextBox 11">
+            <a:extLst>
+              <a:ext uri="{FF2B5EF4-FFF2-40B4-BE49-F238E27FC236}">
+                <a16:creationId xmlns:a16="http://schemas.microsoft.com/office/drawing/2014/main" xmlns="" id="{D3AD2C79-846C-4DD2-83C1-4AD3F8B0F956}"/>
+              </a:ext>
+            </a:extLst>
+          </p:cNvPr>
+          <p:cNvSpPr txBox="1"/>
+          <p:nvPr/>
+        </p:nvSpPr>
+        <p:spPr>
+          <a:xfrm>
+            <a:off x="121708" y="4575527"/>
+            <a:ext cx="6407969" cy="1754326"/>
+          </a:xfrm>
+          <a:prstGeom prst="rect">
+            <a:avLst/>
+          </a:prstGeom>
+          <a:noFill/>
+        </p:spPr>
+        <p:txBody>
+          <a:bodyPr wrap="square" rtlCol="0">
+            <a:spAutoFit/>
+          </a:bodyPr>
+          <a:lstStyle/>
+          <a:p>
+            <a:r>
+              <a:rPr lang="en-US" dirty="0"/>
+              <a:t>If you can’t login, then send an email to both </a:t>
+            </a:r>
+            <a:r>
+              <a:rPr lang="en-US" dirty="0">
+                <a:hlinkClick r:id="rId3"/>
+              </a:rPr>
+              <a:t>HoffmanT@pitt.edu</a:t>
+            </a:r>
+            <a:r>
+              <a:rPr lang="en-US" dirty="0"/>
+              <a:t>  and </a:t>
+            </a:r>
+            <a:r>
+              <a:rPr lang="en-US" dirty="0">
+                <a:hlinkClick r:id="rId4"/>
+              </a:rPr>
+              <a:t>mjd73@pitt.edu</a:t>
+            </a:r>
+            <a:r>
+              <a:rPr lang="en-US" dirty="0"/>
+              <a:t> with a subject line with this format: </a:t>
+            </a:r>
+          </a:p>
+          <a:p>
+            <a:r>
+              <a:rPr lang="en-US" dirty="0"/>
+              <a:t>SUBJ: 401 &lt;</a:t>
+            </a:r>
+            <a:r>
+              <a:rPr lang="en-US" dirty="0" err="1"/>
+              <a:t>pitt</a:t>
+            </a:r>
+            <a:r>
+              <a:rPr lang="en-US" dirty="0"/>
+              <a:t>-username&gt; HANDIN WON’T LET ME LOGIN</a:t>
+            </a:r>
+          </a:p>
+          <a:p>
+            <a:endParaRPr lang="en-US" dirty="0"/>
+          </a:p>
+          <a:p>
+            <a:r>
+              <a:rPr lang="en-US" dirty="0"/>
+              <a:t>Send this from your Pitt address.  In the body of the email, include your full name, Pitt username, and PeopleSoft number.</a:t>
+            </a:r>
+          </a:p>
+        </p:txBody>
+      </p:sp>
+    </p:spTree>
+    <p:extLst>
+      <p:ext uri="{BB962C8B-B14F-4D97-AF65-F5344CB8AC3E}">
+        <p14:creationId xmlns:p14="http://schemas.microsoft.com/office/powerpoint/2010/main" val="2211985909"/>
+      </p:ext>
+    </p:extLst>
+  </p:cSld>
+  <p:clrMapOvr>
+    <a:masterClrMapping/>
+  </p:clrMapOvr>
+</p:sld>
+</file>
+
+<file path=ppt/slides/slide12.xml><?xml version="1.0" encoding="utf-8"?>
+<p:sld xmlns:a="http://schemas.openxmlformats.org/drawingml/2006/main" xmlns:r="http://schemas.openxmlformats.org/officeDocument/2006/relationships" xmlns:p="http://schemas.openxmlformats.org/presentationml/2006/main">
+  <p:cSld>
+    <p:spTree>
+      <p:nvGrpSpPr>
+        <p:cNvPr id="1" name=""/>
+        <p:cNvGrpSpPr/>
+        <p:nvPr/>
+      </p:nvGrpSpPr>
+      <p:grpSpPr>
+        <a:xfrm>
+          <a:off x="0" y="0"/>
+          <a:ext cx="0" cy="0"/>
+          <a:chOff x="0" y="0"/>
+          <a:chExt cx="0" cy="0"/>
+        </a:xfrm>
+      </p:grpSpPr>
+      <p:sp>
+        <p:nvSpPr>
+          <p:cNvPr id="2" name="TextBox 1">
+            <a:extLst>
+              <a:ext uri="{FF2B5EF4-FFF2-40B4-BE49-F238E27FC236}">
+                <a16:creationId xmlns:a16="http://schemas.microsoft.com/office/drawing/2014/main" xmlns="" id="{8A3F13DF-4328-4B16-BDF5-C68E877EB54E}"/>
+              </a:ext>
+            </a:extLst>
+          </p:cNvPr>
+          <p:cNvSpPr txBox="1"/>
+          <p:nvPr/>
+        </p:nvSpPr>
+        <p:spPr>
+          <a:xfrm>
+            <a:off x="0" y="0"/>
+            <a:ext cx="8134066" cy="954107"/>
+          </a:xfrm>
+          <a:prstGeom prst="rect">
+            <a:avLst/>
+          </a:prstGeom>
+        </p:spPr>
+        <p:txBody>
+          <a:bodyPr rtlCol="0">
+            <a:spAutoFit/>
+          </a:bodyPr>
+          <a:lstStyle/>
+          <a:p>
+            <a:r>
+              <a:rPr lang="en-US" sz="2800" dirty="0">
+                <a:solidFill>
+                  <a:srgbClr val="002060"/>
+                </a:solidFill>
+              </a:rPr>
+              <a:t>Submit the four policy PDFs (no modification needed for the policy files)</a:t>
+            </a:r>
+          </a:p>
+        </p:txBody>
+      </p:sp>
+      <p:pic>
+        <p:nvPicPr>
           <p:cNvPr id="6" name="Picture 5" descr="Professor Hoffman's CS 401 - Mozilla Firefox">
             <a:extLst>
               <a:ext uri="{FF2B5EF4-FFF2-40B4-BE49-F238E27FC236}">
-                <a16:creationId xmlns:a16="http://schemas.microsoft.com/office/drawing/2014/main" id="{8DF84075-24A0-4F43-B5EB-B5D4044C97B5}"/>
+                <a16:creationId xmlns:a16="http://schemas.microsoft.com/office/drawing/2014/main" xmlns="" id="{8DF84075-24A0-4F43-B5EB-B5D4044C97B5}"/>
               </a:ext>
             </a:extLst>
           </p:cNvPr>
@@ -3376,7 +3537,7 @@
           <p:cNvPr id="9" name="TextBox 8">
             <a:extLst>
               <a:ext uri="{FF2B5EF4-FFF2-40B4-BE49-F238E27FC236}">
-                <a16:creationId xmlns:a16="http://schemas.microsoft.com/office/drawing/2014/main" id="{E06F5395-736A-4292-93DD-50BE72B166CE}"/>
+                <a16:creationId xmlns:a16="http://schemas.microsoft.com/office/drawing/2014/main" xmlns="" id="{E06F5395-736A-4292-93DD-50BE72B166CE}"/>
               </a:ext>
             </a:extLst>
           </p:cNvPr>
@@ -3456,7 +3617,7 @@
           <p:cNvPr id="4" name="TextBox 3">
             <a:extLst>
               <a:ext uri="{FF2B5EF4-FFF2-40B4-BE49-F238E27FC236}">
-                <a16:creationId xmlns:a16="http://schemas.microsoft.com/office/drawing/2014/main" id="{8A67A37A-C488-40D7-A088-6774405888BB}"/>
+                <a16:creationId xmlns:a16="http://schemas.microsoft.com/office/drawing/2014/main" xmlns="" id="{8A67A37A-C488-40D7-A088-6774405888BB}"/>
               </a:ext>
             </a:extLst>
           </p:cNvPr>
@@ -3494,7 +3655,7 @@
           <p:cNvPr id="5" name="TextBox 4">
             <a:extLst>
               <a:ext uri="{FF2B5EF4-FFF2-40B4-BE49-F238E27FC236}">
-                <a16:creationId xmlns:a16="http://schemas.microsoft.com/office/drawing/2014/main" id="{EC931DCA-4690-4B93-9419-BA902293A61A}"/>
+                <a16:creationId xmlns:a16="http://schemas.microsoft.com/office/drawing/2014/main" xmlns="" id="{EC931DCA-4690-4B93-9419-BA902293A61A}"/>
               </a:ext>
             </a:extLst>
           </p:cNvPr>
@@ -3680,7 +3841,7 @@
           <p:cNvPr id="4" name="TextBox 3">
             <a:extLst>
               <a:ext uri="{FF2B5EF4-FFF2-40B4-BE49-F238E27FC236}">
-                <a16:creationId xmlns:a16="http://schemas.microsoft.com/office/drawing/2014/main" id="{8A67A37A-C488-40D7-A088-6774405888BB}"/>
+                <a16:creationId xmlns:a16="http://schemas.microsoft.com/office/drawing/2014/main" xmlns="" id="{8A67A37A-C488-40D7-A088-6774405888BB}"/>
               </a:ext>
             </a:extLst>
           </p:cNvPr>
@@ -3718,7 +3879,7 @@
           <p:cNvPr id="5" name="TextBox 4">
             <a:extLst>
               <a:ext uri="{FF2B5EF4-FFF2-40B4-BE49-F238E27FC236}">
-                <a16:creationId xmlns:a16="http://schemas.microsoft.com/office/drawing/2014/main" id="{EC931DCA-4690-4B93-9419-BA902293A61A}"/>
+                <a16:creationId xmlns:a16="http://schemas.microsoft.com/office/drawing/2014/main" xmlns="" id="{EC931DCA-4690-4B93-9419-BA902293A61A}"/>
               </a:ext>
             </a:extLst>
           </p:cNvPr>
@@ -3756,7 +3917,7 @@
           <p:cNvPr id="3" name="Rectangle 2">
             <a:extLst>
               <a:ext uri="{FF2B5EF4-FFF2-40B4-BE49-F238E27FC236}">
-                <a16:creationId xmlns:a16="http://schemas.microsoft.com/office/drawing/2014/main" id="{E37F6031-DEB2-42B6-826D-AABF9E1F97BD}"/>
+                <a16:creationId xmlns:a16="http://schemas.microsoft.com/office/drawing/2014/main" xmlns="" id="{E37F6031-DEB2-42B6-826D-AABF9E1F97BD}"/>
               </a:ext>
             </a:extLst>
           </p:cNvPr>
@@ -3793,7 +3954,7 @@
           <p:cNvPr id="6" name="TextBox 5">
             <a:extLst>
               <a:ext uri="{FF2B5EF4-FFF2-40B4-BE49-F238E27FC236}">
-                <a16:creationId xmlns:a16="http://schemas.microsoft.com/office/drawing/2014/main" id="{5A8EDA31-5141-4333-B9AD-568DB481CF77}"/>
+                <a16:creationId xmlns:a16="http://schemas.microsoft.com/office/drawing/2014/main" xmlns="" id="{5A8EDA31-5141-4333-B9AD-568DB481CF77}"/>
               </a:ext>
             </a:extLst>
           </p:cNvPr>
@@ -3956,7 +4117,7 @@
           <p:cNvPr id="4" name="TextBox 3">
             <a:extLst>
               <a:ext uri="{FF2B5EF4-FFF2-40B4-BE49-F238E27FC236}">
-                <a16:creationId xmlns:a16="http://schemas.microsoft.com/office/drawing/2014/main" id="{8A67A37A-C488-40D7-A088-6774405888BB}"/>
+                <a16:creationId xmlns:a16="http://schemas.microsoft.com/office/drawing/2014/main" xmlns="" id="{8A67A37A-C488-40D7-A088-6774405888BB}"/>
               </a:ext>
             </a:extLst>
           </p:cNvPr>
@@ -3994,7 +4155,7 @@
           <p:cNvPr id="5" name="TextBox 4">
             <a:extLst>
               <a:ext uri="{FF2B5EF4-FFF2-40B4-BE49-F238E27FC236}">
-                <a16:creationId xmlns:a16="http://schemas.microsoft.com/office/drawing/2014/main" id="{EC931DCA-4690-4B93-9419-BA902293A61A}"/>
+                <a16:creationId xmlns:a16="http://schemas.microsoft.com/office/drawing/2014/main" xmlns="" id="{EC931DCA-4690-4B93-9419-BA902293A61A}"/>
               </a:ext>
             </a:extLst>
           </p:cNvPr>
@@ -4032,7 +4193,7 @@
           <p:cNvPr id="3" name="Rectangle 2">
             <a:extLst>
               <a:ext uri="{FF2B5EF4-FFF2-40B4-BE49-F238E27FC236}">
-                <a16:creationId xmlns:a16="http://schemas.microsoft.com/office/drawing/2014/main" id="{E37F6031-DEB2-42B6-826D-AABF9E1F97BD}"/>
+                <a16:creationId xmlns:a16="http://schemas.microsoft.com/office/drawing/2014/main" xmlns="" id="{E37F6031-DEB2-42B6-826D-AABF9E1F97BD}"/>
               </a:ext>
             </a:extLst>
           </p:cNvPr>
@@ -4069,7 +4230,7 @@
           <p:cNvPr id="7" name="Picture 6" descr="2020 SPRING CS-401 CS LAB #0 - Mozilla Firefox">
             <a:extLst>
               <a:ext uri="{FF2B5EF4-FFF2-40B4-BE49-F238E27FC236}">
-                <a16:creationId xmlns:a16="http://schemas.microsoft.com/office/drawing/2014/main" id="{E5911A2E-0594-48BB-8078-F10D2E8BA0F8}"/>
+                <a16:creationId xmlns:a16="http://schemas.microsoft.com/office/drawing/2014/main" xmlns="" id="{E5911A2E-0594-48BB-8078-F10D2E8BA0F8}"/>
               </a:ext>
             </a:extLst>
           </p:cNvPr>
@@ -4139,7 +4300,7 @@
           <p:cNvPr id="4" name="TextBox 3">
             <a:extLst>
               <a:ext uri="{FF2B5EF4-FFF2-40B4-BE49-F238E27FC236}">
-                <a16:creationId xmlns:a16="http://schemas.microsoft.com/office/drawing/2014/main" id="{8A67A37A-C488-40D7-A088-6774405888BB}"/>
+                <a16:creationId xmlns:a16="http://schemas.microsoft.com/office/drawing/2014/main" xmlns="" id="{8A67A37A-C488-40D7-A088-6774405888BB}"/>
               </a:ext>
             </a:extLst>
           </p:cNvPr>
@@ -4177,7 +4338,7 @@
           <p:cNvPr id="6" name="TextBox 5">
             <a:extLst>
               <a:ext uri="{FF2B5EF4-FFF2-40B4-BE49-F238E27FC236}">
-                <a16:creationId xmlns:a16="http://schemas.microsoft.com/office/drawing/2014/main" id="{5A8EDA31-5141-4333-B9AD-568DB481CF77}"/>
+                <a16:creationId xmlns:a16="http://schemas.microsoft.com/office/drawing/2014/main" xmlns="" id="{5A8EDA31-5141-4333-B9AD-568DB481CF77}"/>
               </a:ext>
             </a:extLst>
           </p:cNvPr>
@@ -4302,7 +4463,7 @@
           <p:cNvPr id="8" name="Picture 7" descr="Index of /~hoffmant/courseware - Mozilla Firefox">
             <a:extLst>
               <a:ext uri="{FF2B5EF4-FFF2-40B4-BE49-F238E27FC236}">
-                <a16:creationId xmlns:a16="http://schemas.microsoft.com/office/drawing/2014/main" id="{82039F15-C562-456C-8A8B-EF4741E7DC84}"/>
+                <a16:creationId xmlns:a16="http://schemas.microsoft.com/office/drawing/2014/main" xmlns="" id="{82039F15-C562-456C-8A8B-EF4741E7DC84}"/>
               </a:ext>
             </a:extLst>
           </p:cNvPr>
@@ -4372,7 +4533,7 @@
           <p:cNvPr id="4" name="TextBox 3">
             <a:extLst>
               <a:ext uri="{FF2B5EF4-FFF2-40B4-BE49-F238E27FC236}">
-                <a16:creationId xmlns:a16="http://schemas.microsoft.com/office/drawing/2014/main" id="{8A67A37A-C488-40D7-A088-6774405888BB}"/>
+                <a16:creationId xmlns:a16="http://schemas.microsoft.com/office/drawing/2014/main" xmlns="" id="{8A67A37A-C488-40D7-A088-6774405888BB}"/>
               </a:ext>
             </a:extLst>
           </p:cNvPr>
@@ -4410,7 +4571,7 @@
           <p:cNvPr id="6" name="TextBox 5">
             <a:extLst>
               <a:ext uri="{FF2B5EF4-FFF2-40B4-BE49-F238E27FC236}">
-                <a16:creationId xmlns:a16="http://schemas.microsoft.com/office/drawing/2014/main" id="{5A8EDA31-5141-4333-B9AD-568DB481CF77}"/>
+                <a16:creationId xmlns:a16="http://schemas.microsoft.com/office/drawing/2014/main" xmlns="" id="{5A8EDA31-5141-4333-B9AD-568DB481CF77}"/>
               </a:ext>
             </a:extLst>
           </p:cNvPr>
@@ -4556,7 +4717,7 @@
           <p:cNvPr id="4" name="TextBox 3">
             <a:extLst>
               <a:ext uri="{FF2B5EF4-FFF2-40B4-BE49-F238E27FC236}">
-                <a16:creationId xmlns:a16="http://schemas.microsoft.com/office/drawing/2014/main" id="{8A67A37A-C488-40D7-A088-6774405888BB}"/>
+                <a16:creationId xmlns:a16="http://schemas.microsoft.com/office/drawing/2014/main" xmlns="" id="{8A67A37A-C488-40D7-A088-6774405888BB}"/>
               </a:ext>
             </a:extLst>
           </p:cNvPr>
@@ -4594,7 +4755,7 @@
           <p:cNvPr id="3" name="Picture 2" descr="Mozilla Firefox">
             <a:extLst>
               <a:ext uri="{FF2B5EF4-FFF2-40B4-BE49-F238E27FC236}">
-                <a16:creationId xmlns:a16="http://schemas.microsoft.com/office/drawing/2014/main" id="{BEBCEC01-FB4A-46A5-ADAA-99D46A8E2065}"/>
+                <a16:creationId xmlns:a16="http://schemas.microsoft.com/office/drawing/2014/main" xmlns="" id="{BEBCEC01-FB4A-46A5-ADAA-99D46A8E2065}"/>
               </a:ext>
             </a:extLst>
           </p:cNvPr>
@@ -4634,7 +4795,7 @@
           <p:cNvPr id="7" name="Straight Arrow Connector 6">
             <a:extLst>
               <a:ext uri="{FF2B5EF4-FFF2-40B4-BE49-F238E27FC236}">
-                <a16:creationId xmlns:a16="http://schemas.microsoft.com/office/drawing/2014/main" id="{F20A12B7-BCB3-4776-B7E0-A4CEF3DC9504}"/>
+                <a16:creationId xmlns:a16="http://schemas.microsoft.com/office/drawing/2014/main" xmlns="" id="{F20A12B7-BCB3-4776-B7E0-A4CEF3DC9504}"/>
               </a:ext>
             </a:extLst>
           </p:cNvPr>
@@ -4673,7 +4834,7 @@
           <p:cNvPr id="11" name="Picture 10" descr="C:\Users\Karin\Desktop\Hello.java - Notepad++">
             <a:extLst>
               <a:ext uri="{FF2B5EF4-FFF2-40B4-BE49-F238E27FC236}">
-                <a16:creationId xmlns:a16="http://schemas.microsoft.com/office/drawing/2014/main" id="{5E2D0CF3-34FC-4FFD-B51D-F3F35C8431CF}"/>
+                <a16:creationId xmlns:a16="http://schemas.microsoft.com/office/drawing/2014/main" xmlns="" id="{5E2D0CF3-34FC-4FFD-B51D-F3F35C8431CF}"/>
               </a:ext>
             </a:extLst>
           </p:cNvPr>
@@ -4738,7 +4899,7 @@
           <p:cNvPr id="4" name="TextBox 3">
             <a:extLst>
               <a:ext uri="{FF2B5EF4-FFF2-40B4-BE49-F238E27FC236}">
-                <a16:creationId xmlns:a16="http://schemas.microsoft.com/office/drawing/2014/main" id="{8A67A37A-C488-40D7-A088-6774405888BB}"/>
+                <a16:creationId xmlns:a16="http://schemas.microsoft.com/office/drawing/2014/main" xmlns="" id="{8A67A37A-C488-40D7-A088-6774405888BB}"/>
               </a:ext>
             </a:extLst>
           </p:cNvPr>
@@ -4761,25 +4922,24 @@
           <a:lstStyle/>
           <a:p>
             <a:r>
-              <a:rPr lang="en-US" sz="2800" dirty="0">
+              <a:rPr lang="en-US" sz="2800" dirty="0" smtClean="0">
                 <a:solidFill>
                   <a:srgbClr val="002060"/>
                 </a:solidFill>
               </a:rPr>
-              <a:t>Compile and execute the provided Hello.java program</a:t>
-            </a:r>
+              <a:t>Update: </a:t>
+            </a:r>
+            <a:endParaRPr lang="en-US" sz="2800" dirty="0">
+              <a:solidFill>
+                <a:srgbClr val="002060"/>
+              </a:solidFill>
+            </a:endParaRPr>
           </a:p>
         </p:txBody>
       </p:sp>
       <p:pic>
         <p:nvPicPr>
-          <p:cNvPr id="8" name="Picture 7" descr="Command Prompt">
-            <a:extLst>
-              <a:ext uri="{FF2B5EF4-FFF2-40B4-BE49-F238E27FC236}">
-                <a16:creationId xmlns:a16="http://schemas.microsoft.com/office/drawing/2014/main" id="{8D16FDFD-D0FB-4568-8B8D-05D4793646E9}"/>
-              </a:ext>
-            </a:extLst>
-          </p:cNvPr>
+          <p:cNvPr id="2" name="Picture 1" descr="https://people.cs.pitt.edu/~hoffmant/S20-401/labs/lab-00/Hello.java - Google Chrome"/>
           <p:cNvPicPr>
             <a:picLocks noChangeAspect="1"/>
           </p:cNvPicPr>
@@ -4799,8 +4959,8 @@
         </p:blipFill>
         <p:spPr>
           <a:xfrm>
-            <a:off x="409433" y="802774"/>
-            <a:ext cx="7315200" cy="3706226"/>
+            <a:off x="177303" y="639452"/>
+            <a:ext cx="5344607" cy="2749717"/>
           </a:xfrm>
           <a:prstGeom prst="rect">
             <a:avLst/>
@@ -4809,20 +4969,14 @@
       </p:pic>
       <p:sp>
         <p:nvSpPr>
-          <p:cNvPr id="5" name="TextBox 4">
-            <a:extLst>
-              <a:ext uri="{FF2B5EF4-FFF2-40B4-BE49-F238E27FC236}">
-                <a16:creationId xmlns:a16="http://schemas.microsoft.com/office/drawing/2014/main" id="{9256CAE9-CE00-4B53-8899-83D5DAADF0A7}"/>
-              </a:ext>
-            </a:extLst>
-          </p:cNvPr>
+          <p:cNvPr id="5" name="TextBox 4"/>
           <p:cNvSpPr txBox="1"/>
           <p:nvPr/>
         </p:nvSpPr>
         <p:spPr>
           <a:xfrm>
-            <a:off x="409433" y="4653586"/>
-            <a:ext cx="7315200" cy="923330"/>
+            <a:off x="381740" y="3595456"/>
+            <a:ext cx="6267635" cy="1200329"/>
           </a:xfrm>
           <a:prstGeom prst="rect">
             <a:avLst/>
@@ -4836,24 +4990,70 @@
           <a:lstStyle/>
           <a:p>
             <a:r>
-              <a:rPr lang="en-US" dirty="0"/>
-              <a:t>Note that you are not being asked to submit this file, but it would be a very good idea to confirm that you can edit/compile/execute the file </a:t>
-            </a:r>
-            <a:r>
-              <a:rPr lang="en-US" b="1" dirty="0"/>
-              <a:t>on the command line</a:t>
-            </a:r>
-            <a:r>
-              <a:rPr lang="en-US" dirty="0"/>
-              <a:t>.</a:t>
-            </a:r>
+              <a:rPr lang="en-US" dirty="0" smtClean="0"/>
+              <a:t>If your file looks like this, you may need to add </a:t>
+            </a:r>
+            <a:r>
+              <a:rPr lang="en-US" dirty="0" err="1" smtClean="0"/>
+              <a:t>System.out</a:t>
+            </a:r>
+            <a:r>
+              <a:rPr lang="en-US" dirty="0" smtClean="0"/>
+              <a:t> before </a:t>
+            </a:r>
+            <a:r>
+              <a:rPr lang="en-US" dirty="0" err="1" smtClean="0"/>
+              <a:t>println</a:t>
+            </a:r>
+            <a:r>
+              <a:rPr lang="en-US" dirty="0" smtClean="0"/>
+              <a:t> to get it to work.</a:t>
+            </a:r>
+          </a:p>
+          <a:p>
+            <a:endParaRPr lang="en-US" dirty="0"/>
+          </a:p>
+          <a:p>
+            <a:r>
+              <a:rPr lang="en-US" dirty="0" err="1" smtClean="0"/>
+              <a:t>System.out.println</a:t>
+            </a:r>
+            <a:r>
+              <a:rPr lang="en-US" dirty="0" smtClean="0"/>
+              <a:t>( </a:t>
+            </a:r>
+            <a:r>
+              <a:rPr lang="en-US" dirty="0" err="1" smtClean="0"/>
+              <a:t>i</a:t>
+            </a:r>
+            <a:r>
+              <a:rPr lang="en-US" dirty="0" smtClean="0"/>
+              <a:t> + “: “ + </a:t>
+            </a:r>
+            <a:r>
+              <a:rPr lang="en-US" dirty="0" err="1" smtClean="0"/>
+              <a:t>args</a:t>
+            </a:r>
+            <a:r>
+              <a:rPr lang="en-US" dirty="0" smtClean="0"/>
+              <a:t>[</a:t>
+            </a:r>
+            <a:r>
+              <a:rPr lang="en-US" dirty="0" err="1" smtClean="0"/>
+              <a:t>i</a:t>
+            </a:r>
+            <a:r>
+              <a:rPr lang="en-US" dirty="0" smtClean="0"/>
+              <a:t>]);</a:t>
+            </a:r>
+            <a:endParaRPr lang="en-US" dirty="0"/>
           </a:p>
         </p:txBody>
       </p:sp>
     </p:spTree>
     <p:extLst>
       <p:ext uri="{BB962C8B-B14F-4D97-AF65-F5344CB8AC3E}">
-        <p14:creationId xmlns:p14="http://schemas.microsoft.com/office/powerpoint/2010/main" val="1032878230"/>
+        <p14:creationId xmlns:p14="http://schemas.microsoft.com/office/powerpoint/2010/main" val="466308617"/>
       </p:ext>
     </p:extLst>
   </p:cSld>
@@ -4882,10 +5082,10 @@
       </p:grpSpPr>
       <p:sp>
         <p:nvSpPr>
-          <p:cNvPr id="2" name="TextBox 1">
+          <p:cNvPr id="4" name="TextBox 3">
             <a:extLst>
               <a:ext uri="{FF2B5EF4-FFF2-40B4-BE49-F238E27FC236}">
-                <a16:creationId xmlns:a16="http://schemas.microsoft.com/office/drawing/2014/main" id="{8A3F13DF-4328-4B16-BDF5-C68E877EB54E}"/>
+                <a16:creationId xmlns:a16="http://schemas.microsoft.com/office/drawing/2014/main" xmlns="" id="{8A67A37A-C488-40D7-A088-6774405888BB}"/>
               </a:ext>
             </a:extLst>
           </p:cNvPr>
@@ -4913,17 +5113,17 @@
                   <a:srgbClr val="002060"/>
                 </a:solidFill>
               </a:rPr>
-              <a:t>Download and review the four policy documents</a:t>
+              <a:t>Compile and execute the provided Hello.java program</a:t>
             </a:r>
           </a:p>
         </p:txBody>
       </p:sp>
       <p:pic>
         <p:nvPicPr>
-          <p:cNvPr id="5" name="Picture 4" descr="2020 SPRING CS-401 CS LAB #0 - Mozilla Firefox">
+          <p:cNvPr id="8" name="Picture 7" descr="Command Prompt">
             <a:extLst>
               <a:ext uri="{FF2B5EF4-FFF2-40B4-BE49-F238E27FC236}">
-                <a16:creationId xmlns:a16="http://schemas.microsoft.com/office/drawing/2014/main" id="{0488EA90-049C-44E9-A737-5F815994EAD3}"/>
+                <a16:creationId xmlns:a16="http://schemas.microsoft.com/office/drawing/2014/main" xmlns="" id="{8D16FDFD-D0FB-4568-8B8D-05D4793646E9}"/>
               </a:ext>
             </a:extLst>
           </p:cNvPr>
@@ -4932,7 +5132,7 @@
           </p:cNvPicPr>
           <p:nvPr/>
         </p:nvPicPr>
-        <p:blipFill rotWithShape="1">
+        <p:blipFill>
           <a:blip r:embed="rId2">
             <a:extLst>
               <a:ext uri="{28A0092B-C50C-407E-A947-70E740481C1C}">
@@ -4940,80 +5140,67 @@
               </a:ext>
             </a:extLst>
           </a:blip>
-          <a:srcRect t="5666" r="4434" b="25366"/>
-          <a:stretch/>
+          <a:stretch>
+            <a:fillRect/>
+          </a:stretch>
         </p:blipFill>
         <p:spPr>
           <a:xfrm>
-            <a:off x="102591" y="878833"/>
-            <a:ext cx="8651116" cy="3384371"/>
+            <a:off x="409433" y="802774"/>
+            <a:ext cx="7315200" cy="3706226"/>
           </a:xfrm>
           <a:prstGeom prst="rect">
             <a:avLst/>
           </a:prstGeom>
-          <a:ln>
-            <a:solidFill>
-              <a:schemeClr val="tx1"/>
-            </a:solidFill>
-          </a:ln>
         </p:spPr>
       </p:pic>
       <p:sp>
         <p:nvSpPr>
-          <p:cNvPr id="7" name="Rectangle 6">
+          <p:cNvPr id="5" name="TextBox 4">
             <a:extLst>
               <a:ext uri="{FF2B5EF4-FFF2-40B4-BE49-F238E27FC236}">
-                <a16:creationId xmlns:a16="http://schemas.microsoft.com/office/drawing/2014/main" id="{9DCE6BE8-7B2E-4F21-8CDA-BF6F30E4CDC3}"/>
+                <a16:creationId xmlns:a16="http://schemas.microsoft.com/office/drawing/2014/main" xmlns="" id="{9256CAE9-CE00-4B53-8899-83D5DAADF0A7}"/>
               </a:ext>
             </a:extLst>
           </p:cNvPr>
-          <p:cNvSpPr/>
+          <p:cNvSpPr txBox="1"/>
           <p:nvPr/>
         </p:nvSpPr>
         <p:spPr>
           <a:xfrm>
-            <a:off x="568712" y="3491219"/>
-            <a:ext cx="1338147" cy="523220"/>
+            <a:off x="409433" y="4653586"/>
+            <a:ext cx="7315200" cy="923330"/>
           </a:xfrm>
           <a:prstGeom prst="rect">
             <a:avLst/>
           </a:prstGeom>
           <a:noFill/>
-          <a:ln w="38100">
-            <a:solidFill>
-              <a:srgbClr val="92D050"/>
-            </a:solidFill>
-          </a:ln>
-        </p:spPr>
-        <p:style>
-          <a:lnRef idx="2">
-            <a:schemeClr val="accent1">
-              <a:shade val="50000"/>
-            </a:schemeClr>
-          </a:lnRef>
-          <a:fillRef idx="1">
-            <a:schemeClr val="accent1"/>
-          </a:fillRef>
-          <a:effectRef idx="0">
-            <a:schemeClr val="accent1"/>
-          </a:effectRef>
-          <a:fontRef idx="minor">
-            <a:schemeClr val="lt1"/>
-          </a:fontRef>
-        </p:style>
-        <p:txBody>
-          <a:bodyPr rtlCol="0" anchor="ctr"/>
-          <a:lstStyle/>
-          <a:p>
-            <a:pPr algn="ctr"/>
-            <a:endParaRPr lang="en-US"/>
+        </p:spPr>
+        <p:txBody>
+          <a:bodyPr wrap="square" rtlCol="0">
+            <a:spAutoFit/>
+          </a:bodyPr>
+          <a:lstStyle/>
+          <a:p>
+            <a:r>
+              <a:rPr lang="en-US" dirty="0"/>
+              <a:t>Note that you are not being asked to submit this file, but it would be a very good idea to confirm that you can edit/compile/execute the file </a:t>
+            </a:r>
+            <a:r>
+              <a:rPr lang="en-US" b="1" dirty="0"/>
+              <a:t>on the command line</a:t>
+            </a:r>
+            <a:r>
+              <a:rPr lang="en-US" dirty="0"/>
+              <a:t>.</a:t>
+            </a:r>
           </a:p>
         </p:txBody>
       </p:sp>
     </p:spTree>
     <p:extLst>
       <p:ext uri="{BB962C8B-B14F-4D97-AF65-F5344CB8AC3E}">
-        <p14:creationId xmlns:p14="http://schemas.microsoft.com/office/powerpoint/2010/main" val="1466707125"/>
+        <p14:creationId xmlns:p14="http://schemas.microsoft.com/office/powerpoint/2010/main" val="1032878230"/>
       </p:ext>
     </p:extLst>
   </p:cSld>

</xml_diff>